<commit_message>
Update presentation with training and reconstructions
</commit_message>
<xml_diff>
--- a/Project/Resources/presentation.pptx
+++ b/Project/Resources/presentation.pptx
@@ -10,10 +10,10 @@
     <p:sldMasterId id="2147483697" r:id="rId6"/>
   </p:sldMasterIdLst>
   <p:notesMasterIdLst>
-    <p:notesMasterId r:id="rId13"/>
+    <p:notesMasterId r:id="rId15"/>
   </p:notesMasterIdLst>
   <p:handoutMasterIdLst>
-    <p:handoutMasterId r:id="rId14"/>
+    <p:handoutMasterId r:id="rId16"/>
   </p:handoutMasterIdLst>
   <p:sldIdLst>
     <p:sldId id="355" r:id="rId7"/>
@@ -22,6 +22,8 @@
     <p:sldId id="358" r:id="rId10"/>
     <p:sldId id="359" r:id="rId11"/>
     <p:sldId id="360" r:id="rId12"/>
+    <p:sldId id="361" r:id="rId13"/>
+    <p:sldId id="362" r:id="rId14"/>
   </p:sldIdLst>
   <p:sldSz cx="9144000" cy="6858000" type="screen4x3"/>
   <p:notesSz cx="9925050" cy="6665913"/>
@@ -1054,6 +1056,362 @@
 </p:notes>
 </file>
 
+<file path=ppt/notesSlides/notesSlide3.xml><?xml version="1.0" encoding="utf-8"?>
+<p:notes xmlns:a="http://schemas.openxmlformats.org/drawingml/2006/main" xmlns:r="http://schemas.openxmlformats.org/officeDocument/2006/relationships" xmlns:p="http://schemas.openxmlformats.org/presentationml/2006/main">
+  <p:cSld>
+    <p:spTree>
+      <p:nvGrpSpPr>
+        <p:cNvPr id="1" name=""/>
+        <p:cNvGrpSpPr/>
+        <p:nvPr/>
+      </p:nvGrpSpPr>
+      <p:grpSpPr>
+        <a:xfrm>
+          <a:off x="0" y="0"/>
+          <a:ext cx="0" cy="0"/>
+          <a:chOff x="0" y="0"/>
+          <a:chExt cx="0" cy="0"/>
+        </a:xfrm>
+      </p:grpSpPr>
+      <p:sp>
+        <p:nvSpPr>
+          <p:cNvPr id="2" name="Slide Image Placeholder 1"/>
+          <p:cNvSpPr>
+            <a:spLocks noGrp="1" noRot="1" noChangeAspect="1"/>
+          </p:cNvSpPr>
+          <p:nvPr>
+            <p:ph type="sldImg"/>
+          </p:nvPr>
+        </p:nvSpPr>
+        <p:spPr/>
+      </p:sp>
+      <p:sp>
+        <p:nvSpPr>
+          <p:cNvPr id="3" name="Notes Placeholder 2"/>
+          <p:cNvSpPr>
+            <a:spLocks noGrp="1"/>
+          </p:cNvSpPr>
+          <p:nvPr>
+            <p:ph type="body" idx="1"/>
+          </p:nvPr>
+        </p:nvSpPr>
+        <p:spPr/>
+        <p:txBody>
+          <a:bodyPr/>
+          <a:lstStyle/>
+          <a:p>
+            <a:r>
+              <a:rPr lang="en-GB" sz="1800" dirty="0">
+                <a:effectLst/>
+                <a:latin typeface="NimbusRomNo9L"/>
+              </a:rPr>
+              <a:t>• </a:t>
+            </a:r>
+            <a:r>
+              <a:rPr lang="en-GB" sz="1800" b="0" dirty="0">
+                <a:effectLst/>
+                <a:latin typeface="NimbusRomNo9L"/>
+              </a:rPr>
+              <a:t>3D-RETR-Avg-Fusion </a:t>
+            </a:r>
+            <a:r>
+              <a:rPr lang="en-GB" sz="1800" dirty="0">
+                <a:effectLst/>
+                <a:latin typeface="NimbusRomNo9L"/>
+              </a:rPr>
+              <a:t>this is our implementation of the 3D-RETR-B model</a:t>
+            </a:r>
+            <a:endParaRPr lang="en-GB" dirty="0"/>
+          </a:p>
+          <a:p>
+            <a:r>
+              <a:rPr lang="en-GB" sz="1800" dirty="0">
+                <a:effectLst/>
+                <a:latin typeface="NimbusRomNo9L"/>
+              </a:rPr>
+              <a:t>• </a:t>
+            </a:r>
+            <a:r>
+              <a:rPr lang="en-GB" sz="1800" b="0" dirty="0">
+                <a:effectLst/>
+                <a:latin typeface="NimbusRomNo9L"/>
+              </a:rPr>
+              <a:t>3D-RETR-Deep-Fusion </a:t>
+            </a:r>
+            <a:r>
+              <a:rPr lang="en-GB" sz="1800" dirty="0">
+                <a:effectLst/>
+                <a:latin typeface="NimbusRomNo9L"/>
+              </a:rPr>
+              <a:t>this is our extension with the transformer for multi-view fusion</a:t>
+            </a:r>
+            <a:endParaRPr lang="en-GB" dirty="0"/>
+          </a:p>
+          <a:p>
+            <a:r>
+              <a:rPr lang="en-GB" sz="1800" dirty="0">
+                <a:effectLst/>
+                <a:latin typeface="NimbusRomNo9L"/>
+              </a:rPr>
+              <a:t>• </a:t>
+            </a:r>
+            <a:r>
+              <a:rPr lang="en-GB" sz="1800" b="0" dirty="0">
+                <a:effectLst/>
+                <a:latin typeface="NimbusRomNo9L"/>
+              </a:rPr>
+              <a:t>3D-RETR-Avg-Fusion-E </a:t>
+            </a:r>
+            <a:r>
+              <a:rPr lang="en-GB" sz="1800" dirty="0">
+                <a:effectLst/>
+                <a:latin typeface="NimbusRomNo9L"/>
+              </a:rPr>
+              <a:t>this is the same as the 3D- RETR-</a:t>
+            </a:r>
+            <a:r>
+              <a:rPr lang="en-GB" sz="1800" dirty="0" err="1">
+                <a:effectLst/>
+                <a:latin typeface="NimbusRomNo9L"/>
+              </a:rPr>
+              <a:t>Avg</a:t>
+            </a:r>
+            <a:r>
+              <a:rPr lang="en-GB" sz="1800" dirty="0">
+                <a:effectLst/>
+                <a:latin typeface="NimbusRomNo9L"/>
+              </a:rPr>
+              <a:t>-Fusion model but stopped early during training</a:t>
+            </a:r>
+            <a:endParaRPr lang="en-GB" dirty="0"/>
+          </a:p>
+          <a:p>
+            <a:endParaRPr lang="en-US" dirty="0"/>
+          </a:p>
+        </p:txBody>
+      </p:sp>
+      <p:sp>
+        <p:nvSpPr>
+          <p:cNvPr id="4" name="Slide Number Placeholder 3"/>
+          <p:cNvSpPr>
+            <a:spLocks noGrp="1"/>
+          </p:cNvSpPr>
+          <p:nvPr>
+            <p:ph type="sldNum" sz="quarter" idx="5"/>
+          </p:nvPr>
+        </p:nvSpPr>
+        <p:spPr/>
+        <p:txBody>
+          <a:bodyPr/>
+          <a:lstStyle/>
+          <a:p>
+            <a:pPr>
+              <a:defRPr/>
+            </a:pPr>
+            <a:fld id="{00AFC6D0-44D5-4EB7-828F-6F464F83D79A}" type="slidenum">
+              <a:rPr lang="en-GB" smtClean="0"/>
+              <a:pPr>
+                <a:defRPr/>
+              </a:pPr>
+              <a:t>6</a:t>
+            </a:fld>
+            <a:endParaRPr lang="en-GB"/>
+          </a:p>
+        </p:txBody>
+      </p:sp>
+    </p:spTree>
+    <p:extLst>
+      <p:ext uri="{BB962C8B-B14F-4D97-AF65-F5344CB8AC3E}">
+        <p14:creationId xmlns:p14="http://schemas.microsoft.com/office/powerpoint/2010/main" val="3727693244"/>
+      </p:ext>
+    </p:extLst>
+  </p:cSld>
+  <p:clrMapOvr>
+    <a:masterClrMapping/>
+  </p:clrMapOvr>
+</p:notes>
+</file>
+
+<file path=ppt/notesSlides/notesSlide4.xml><?xml version="1.0" encoding="utf-8"?>
+<p:notes xmlns:a="http://schemas.openxmlformats.org/drawingml/2006/main" xmlns:r="http://schemas.openxmlformats.org/officeDocument/2006/relationships" xmlns:p="http://schemas.openxmlformats.org/presentationml/2006/main">
+  <p:cSld>
+    <p:spTree>
+      <p:nvGrpSpPr>
+        <p:cNvPr id="1" name=""/>
+        <p:cNvGrpSpPr/>
+        <p:nvPr/>
+      </p:nvGrpSpPr>
+      <p:grpSpPr>
+        <a:xfrm>
+          <a:off x="0" y="0"/>
+          <a:ext cx="0" cy="0"/>
+          <a:chOff x="0" y="0"/>
+          <a:chExt cx="0" cy="0"/>
+        </a:xfrm>
+      </p:grpSpPr>
+      <p:sp>
+        <p:nvSpPr>
+          <p:cNvPr id="2" name="Slide Image Placeholder 1"/>
+          <p:cNvSpPr>
+            <a:spLocks noGrp="1" noRot="1" noChangeAspect="1"/>
+          </p:cNvSpPr>
+          <p:nvPr>
+            <p:ph type="sldImg"/>
+          </p:nvPr>
+        </p:nvSpPr>
+        <p:spPr/>
+      </p:sp>
+      <p:sp>
+        <p:nvSpPr>
+          <p:cNvPr id="3" name="Notes Placeholder 2"/>
+          <p:cNvSpPr>
+            <a:spLocks noGrp="1"/>
+          </p:cNvSpPr>
+          <p:nvPr>
+            <p:ph type="body" idx="1"/>
+          </p:nvPr>
+        </p:nvSpPr>
+        <p:spPr/>
+        <p:txBody>
+          <a:bodyPr/>
+          <a:lstStyle/>
+          <a:p>
+            <a:endParaRPr lang="en-US" dirty="0"/>
+          </a:p>
+        </p:txBody>
+      </p:sp>
+      <p:sp>
+        <p:nvSpPr>
+          <p:cNvPr id="4" name="Slide Number Placeholder 3"/>
+          <p:cNvSpPr>
+            <a:spLocks noGrp="1"/>
+          </p:cNvSpPr>
+          <p:nvPr>
+            <p:ph type="sldNum" sz="quarter" idx="5"/>
+          </p:nvPr>
+        </p:nvSpPr>
+        <p:spPr/>
+        <p:txBody>
+          <a:bodyPr/>
+          <a:lstStyle/>
+          <a:p>
+            <a:pPr>
+              <a:defRPr/>
+            </a:pPr>
+            <a:fld id="{00AFC6D0-44D5-4EB7-828F-6F464F83D79A}" type="slidenum">
+              <a:rPr lang="en-GB" smtClean="0"/>
+              <a:pPr>
+                <a:defRPr/>
+              </a:pPr>
+              <a:t>7</a:t>
+            </a:fld>
+            <a:endParaRPr lang="en-GB"/>
+          </a:p>
+        </p:txBody>
+      </p:sp>
+    </p:spTree>
+    <p:extLst>
+      <p:ext uri="{BB962C8B-B14F-4D97-AF65-F5344CB8AC3E}">
+        <p14:creationId xmlns:p14="http://schemas.microsoft.com/office/powerpoint/2010/main" val="1053271199"/>
+      </p:ext>
+    </p:extLst>
+  </p:cSld>
+  <p:clrMapOvr>
+    <a:masterClrMapping/>
+  </p:clrMapOvr>
+</p:notes>
+</file>
+
+<file path=ppt/notesSlides/notesSlide5.xml><?xml version="1.0" encoding="utf-8"?>
+<p:notes xmlns:a="http://schemas.openxmlformats.org/drawingml/2006/main" xmlns:r="http://schemas.openxmlformats.org/officeDocument/2006/relationships" xmlns:p="http://schemas.openxmlformats.org/presentationml/2006/main">
+  <p:cSld>
+    <p:spTree>
+      <p:nvGrpSpPr>
+        <p:cNvPr id="1" name=""/>
+        <p:cNvGrpSpPr/>
+        <p:nvPr/>
+      </p:nvGrpSpPr>
+      <p:grpSpPr>
+        <a:xfrm>
+          <a:off x="0" y="0"/>
+          <a:ext cx="0" cy="0"/>
+          <a:chOff x="0" y="0"/>
+          <a:chExt cx="0" cy="0"/>
+        </a:xfrm>
+      </p:grpSpPr>
+      <p:sp>
+        <p:nvSpPr>
+          <p:cNvPr id="2" name="Slide Image Placeholder 1"/>
+          <p:cNvSpPr>
+            <a:spLocks noGrp="1" noRot="1" noChangeAspect="1"/>
+          </p:cNvSpPr>
+          <p:nvPr>
+            <p:ph type="sldImg"/>
+          </p:nvPr>
+        </p:nvSpPr>
+        <p:spPr/>
+      </p:sp>
+      <p:sp>
+        <p:nvSpPr>
+          <p:cNvPr id="3" name="Notes Placeholder 2"/>
+          <p:cNvSpPr>
+            <a:spLocks noGrp="1"/>
+          </p:cNvSpPr>
+          <p:nvPr>
+            <p:ph type="body" idx="1"/>
+          </p:nvPr>
+        </p:nvSpPr>
+        <p:spPr/>
+        <p:txBody>
+          <a:bodyPr/>
+          <a:lstStyle/>
+          <a:p>
+            <a:endParaRPr lang="en-US" dirty="0"/>
+          </a:p>
+        </p:txBody>
+      </p:sp>
+      <p:sp>
+        <p:nvSpPr>
+          <p:cNvPr id="4" name="Slide Number Placeholder 3"/>
+          <p:cNvSpPr>
+            <a:spLocks noGrp="1"/>
+          </p:cNvSpPr>
+          <p:nvPr>
+            <p:ph type="sldNum" sz="quarter" idx="5"/>
+          </p:nvPr>
+        </p:nvSpPr>
+        <p:spPr/>
+        <p:txBody>
+          <a:bodyPr/>
+          <a:lstStyle/>
+          <a:p>
+            <a:pPr>
+              <a:defRPr/>
+            </a:pPr>
+            <a:fld id="{00AFC6D0-44D5-4EB7-828F-6F464F83D79A}" type="slidenum">
+              <a:rPr lang="en-GB" smtClean="0"/>
+              <a:pPr>
+                <a:defRPr/>
+              </a:pPr>
+              <a:t>8</a:t>
+            </a:fld>
+            <a:endParaRPr lang="en-GB"/>
+          </a:p>
+        </p:txBody>
+      </p:sp>
+    </p:spTree>
+    <p:extLst>
+      <p:ext uri="{BB962C8B-B14F-4D97-AF65-F5344CB8AC3E}">
+        <p14:creationId xmlns:p14="http://schemas.microsoft.com/office/powerpoint/2010/main" val="1829155931"/>
+      </p:ext>
+    </p:extLst>
+  </p:cSld>
+  <p:clrMapOvr>
+    <a:masterClrMapping/>
+  </p:clrMapOvr>
+</p:notes>
+</file>
+
 <file path=ppt/slideLayouts/slideLayout1.xml><?xml version="1.0" encoding="utf-8"?>
 <p:sldLayout xmlns:a="http://schemas.openxmlformats.org/drawingml/2006/main" xmlns:r="http://schemas.openxmlformats.org/officeDocument/2006/relationships" xmlns:p="http://schemas.openxmlformats.org/presentationml/2006/main" preserve="1" userDrawn="1">
   <p:cSld name="Start">
@@ -10257,7 +10615,7 @@
       </p:pic>
       <p:sp>
         <p:nvSpPr>
-          <p:cNvPr id="11" name="Rectangle 10">
+          <p:cNvPr id="11" name="Rounded Rectangle 10">
             <a:extLst>
               <a:ext uri="{FF2B5EF4-FFF2-40B4-BE49-F238E27FC236}">
                 <a16:creationId xmlns:a16="http://schemas.microsoft.com/office/drawing/2014/main" id="{4B674127-846B-3AC4-3D57-EA73EA3A450F}"/>
@@ -10272,7 +10630,7 @@
             <a:off x="3889248" y="2133600"/>
             <a:ext cx="1530096" cy="2322576"/>
           </a:xfrm>
-          <a:prstGeom prst="rect">
+          <a:prstGeom prst="roundRect">
             <a:avLst/>
           </a:prstGeom>
           <a:solidFill>
@@ -10283,6 +10641,9 @@
           <a:ln>
             <a:noFill/>
           </a:ln>
+          <a:effectLst>
+            <a:softEdge rad="0"/>
+          </a:effectLst>
         </p:spPr>
         <p:style>
           <a:lnRef idx="0">
@@ -10425,6 +10786,144 @@
           <a:bodyPr/>
           <a:lstStyle/>
           <a:p>
+            <a:pPr marL="285750" indent="-285750">
+              <a:buFont typeface="Arial" panose="020B0604020202020204" pitchFamily="34" charset="0"/>
+              <a:buChar char="•"/>
+            </a:pPr>
+            <a:r>
+              <a:rPr lang="en-GB" sz="1800" dirty="0" err="1">
+                <a:effectLst/>
+                <a:latin typeface="NimbusRomNo9L"/>
+              </a:rPr>
+              <a:t>ShapeNet</a:t>
+            </a:r>
+            <a:r>
+              <a:rPr lang="en-GB" sz="1800" dirty="0">
+                <a:effectLst/>
+                <a:latin typeface="NimbusRomNo9L"/>
+              </a:rPr>
+              <a:t> dataset (80% training, 10% validation and 10% testing)</a:t>
+            </a:r>
+          </a:p>
+          <a:p>
+            <a:pPr marL="285750" indent="-285750">
+              <a:buFont typeface="Arial" panose="020B0604020202020204" pitchFamily="34" charset="0"/>
+              <a:buChar char="•"/>
+            </a:pPr>
+            <a:endParaRPr lang="en-GB" sz="1800" dirty="0">
+              <a:latin typeface="NimbusRomNo9L"/>
+            </a:endParaRPr>
+          </a:p>
+          <a:p>
+            <a:pPr marL="285750" indent="-285750">
+              <a:buFont typeface="Arial" panose="020B0604020202020204" pitchFamily="34" charset="0"/>
+              <a:buChar char="•"/>
+            </a:pPr>
+            <a:r>
+              <a:rPr lang="en-GB" sz="1800" dirty="0">
+                <a:effectLst/>
+                <a:latin typeface="NimbusRomNo9L"/>
+              </a:rPr>
+              <a:t>3 models trained:</a:t>
+            </a:r>
+          </a:p>
+          <a:p>
+            <a:pPr marL="461963" lvl="1" indent="-285750">
+              <a:buFont typeface="Arial" panose="020B0604020202020204" pitchFamily="34" charset="0"/>
+              <a:buChar char="•"/>
+            </a:pPr>
+            <a:endParaRPr lang="en-GB" sz="1800" dirty="0">
+              <a:latin typeface="NimbusRomNo9L"/>
+            </a:endParaRPr>
+          </a:p>
+          <a:p>
+            <a:pPr marL="461963" lvl="1" indent="-285750">
+              <a:buFont typeface="Wingdings" pitchFamily="2" charset="2"/>
+              <a:buChar char="§"/>
+            </a:pPr>
+            <a:r>
+              <a:rPr lang="en-GB" sz="1800" b="0" dirty="0">
+                <a:effectLst/>
+                <a:latin typeface="NimbusRomNo9L"/>
+              </a:rPr>
+              <a:t>3D-RETR-Avg-Fusion </a:t>
+            </a:r>
+            <a:endParaRPr lang="en-GB" sz="2000" dirty="0"/>
+          </a:p>
+          <a:p>
+            <a:pPr marL="461963" lvl="1" indent="-285750">
+              <a:buFont typeface="Wingdings" pitchFamily="2" charset="2"/>
+              <a:buChar char="§"/>
+            </a:pPr>
+            <a:endParaRPr lang="en-GB" sz="1800" dirty="0">
+              <a:effectLst/>
+              <a:latin typeface="NimbusRomNo9L"/>
+            </a:endParaRPr>
+          </a:p>
+          <a:p>
+            <a:pPr marL="461963" lvl="1" indent="-285750">
+              <a:buFont typeface="Wingdings" pitchFamily="2" charset="2"/>
+              <a:buChar char="§"/>
+            </a:pPr>
+            <a:r>
+              <a:rPr lang="en-GB" sz="1800" b="0" dirty="0">
+                <a:effectLst/>
+                <a:latin typeface="NimbusRomNo9L"/>
+              </a:rPr>
+              <a:t>3D-RETR-Deep-Fusion </a:t>
+            </a:r>
+            <a:endParaRPr lang="en-GB" sz="2000" dirty="0"/>
+          </a:p>
+          <a:p>
+            <a:pPr marL="461963" lvl="1" indent="-285750">
+              <a:buFont typeface="Wingdings" pitchFamily="2" charset="2"/>
+              <a:buChar char="§"/>
+            </a:pPr>
+            <a:endParaRPr lang="en-GB" sz="1800" dirty="0">
+              <a:latin typeface="NimbusRomNo9L"/>
+            </a:endParaRPr>
+          </a:p>
+          <a:p>
+            <a:pPr marL="461963" lvl="1" indent="-285750">
+              <a:buFont typeface="Wingdings" pitchFamily="2" charset="2"/>
+              <a:buChar char="§"/>
+            </a:pPr>
+            <a:r>
+              <a:rPr lang="en-GB" sz="1800" b="0" dirty="0">
+                <a:effectLst/>
+                <a:latin typeface="NimbusRomNo9L"/>
+              </a:rPr>
+              <a:t>3D-RETR-Avg-Fusion-E </a:t>
+            </a:r>
+            <a:endParaRPr lang="en-GB" sz="2000" dirty="0"/>
+          </a:p>
+          <a:p>
+            <a:pPr marL="461963" lvl="1" indent="-285750">
+              <a:buFont typeface="Arial" panose="020B0604020202020204" pitchFamily="34" charset="0"/>
+              <a:buChar char="•"/>
+            </a:pPr>
+            <a:endParaRPr lang="en-GB" sz="1800" dirty="0">
+              <a:effectLst/>
+              <a:latin typeface="NimbusRomNo9L"/>
+            </a:endParaRPr>
+          </a:p>
+          <a:p>
+            <a:pPr marL="285750" indent="-285750">
+              <a:buFont typeface="Arial" panose="020B0604020202020204" pitchFamily="34" charset="0"/>
+              <a:buChar char="•"/>
+            </a:pPr>
+            <a:endParaRPr lang="en-GB" sz="1800" dirty="0">
+              <a:latin typeface="NimbusRomNo9L"/>
+            </a:endParaRPr>
+          </a:p>
+          <a:p>
+            <a:pPr marL="285750" indent="-285750">
+              <a:buFont typeface="Arial" panose="020B0604020202020204" pitchFamily="34" charset="0"/>
+              <a:buChar char="•"/>
+            </a:pPr>
+            <a:endParaRPr lang="en-GB" dirty="0"/>
+          </a:p>
+          <a:p>
             <a:endParaRPr lang="en-US" dirty="0"/>
           </a:p>
         </p:txBody>
@@ -10433,6 +10932,477 @@
     <p:extLst>
       <p:ext uri="{BB962C8B-B14F-4D97-AF65-F5344CB8AC3E}">
         <p14:creationId xmlns:p14="http://schemas.microsoft.com/office/powerpoint/2010/main" val="2947865573"/>
+      </p:ext>
+    </p:extLst>
+  </p:cSld>
+  <p:clrMapOvr>
+    <a:masterClrMapping/>
+  </p:clrMapOvr>
+</p:sld>
+</file>
+
+<file path=ppt/slides/slide7.xml><?xml version="1.0" encoding="utf-8"?>
+<p:sld xmlns:a="http://schemas.openxmlformats.org/drawingml/2006/main" xmlns:r="http://schemas.openxmlformats.org/officeDocument/2006/relationships" xmlns:p="http://schemas.openxmlformats.org/presentationml/2006/main">
+  <p:cSld>
+    <p:spTree>
+      <p:nvGrpSpPr>
+        <p:cNvPr id="1" name=""/>
+        <p:cNvGrpSpPr/>
+        <p:nvPr/>
+      </p:nvGrpSpPr>
+      <p:grpSpPr>
+        <a:xfrm>
+          <a:off x="0" y="0"/>
+          <a:ext cx="0" cy="0"/>
+          <a:chOff x="0" y="0"/>
+          <a:chExt cx="0" cy="0"/>
+        </a:xfrm>
+      </p:grpSpPr>
+      <p:sp>
+        <p:nvSpPr>
+          <p:cNvPr id="3" name="Slide Number Placeholder 2">
+            <a:extLst>
+              <a:ext uri="{FF2B5EF4-FFF2-40B4-BE49-F238E27FC236}">
+                <a16:creationId xmlns:a16="http://schemas.microsoft.com/office/drawing/2014/main" id="{A94A60AC-B9B3-AF59-E847-984597B2945A}"/>
+              </a:ext>
+            </a:extLst>
+          </p:cNvPr>
+          <p:cNvSpPr>
+            <a:spLocks noGrp="1"/>
+          </p:cNvSpPr>
+          <p:nvPr>
+            <p:ph type="sldNum" sz="quarter" idx="11"/>
+          </p:nvPr>
+        </p:nvSpPr>
+        <p:spPr/>
+        <p:txBody>
+          <a:bodyPr/>
+          <a:lstStyle/>
+          <a:p>
+            <a:fld id="{CE58CB1E-F828-4F11-99E0-327109AF9DA4}" type="slidenum">
+              <a:rPr lang="de-DE" smtClean="0"/>
+              <a:pPr/>
+              <a:t>7</a:t>
+            </a:fld>
+            <a:endParaRPr lang="de-DE" dirty="0"/>
+          </a:p>
+        </p:txBody>
+      </p:sp>
+      <p:sp>
+        <p:nvSpPr>
+          <p:cNvPr id="5" name="Title 4">
+            <a:extLst>
+              <a:ext uri="{FF2B5EF4-FFF2-40B4-BE49-F238E27FC236}">
+                <a16:creationId xmlns:a16="http://schemas.microsoft.com/office/drawing/2014/main" id="{390DBEAC-D603-E343-552D-9EB20251DA02}"/>
+              </a:ext>
+            </a:extLst>
+          </p:cNvPr>
+          <p:cNvSpPr>
+            <a:spLocks noGrp="1"/>
+          </p:cNvSpPr>
+          <p:nvPr>
+            <p:ph type="title"/>
+          </p:nvPr>
+        </p:nvSpPr>
+        <p:spPr/>
+        <p:txBody>
+          <a:bodyPr/>
+          <a:lstStyle/>
+          <a:p>
+            <a:r>
+              <a:rPr lang="en-US" dirty="0"/>
+              <a:t>Training</a:t>
+            </a:r>
+          </a:p>
+        </p:txBody>
+      </p:sp>
+      <p:sp>
+        <p:nvSpPr>
+          <p:cNvPr id="4" name="Content Placeholder 3">
+            <a:extLst>
+              <a:ext uri="{FF2B5EF4-FFF2-40B4-BE49-F238E27FC236}">
+                <a16:creationId xmlns:a16="http://schemas.microsoft.com/office/drawing/2014/main" id="{48405292-3E50-4195-8E6A-AAD213C54DC2}"/>
+              </a:ext>
+            </a:extLst>
+          </p:cNvPr>
+          <p:cNvSpPr>
+            <a:spLocks noGrp="1"/>
+          </p:cNvSpPr>
+          <p:nvPr>
+            <p:ph idx="1"/>
+          </p:nvPr>
+        </p:nvSpPr>
+        <p:spPr/>
+        <p:txBody>
+          <a:bodyPr/>
+          <a:lstStyle/>
+          <a:p>
+            <a:pPr marL="461963" lvl="1" indent="-285750">
+              <a:buFont typeface="Arial" panose="020B0604020202020204" pitchFamily="34" charset="0"/>
+              <a:buChar char="•"/>
+            </a:pPr>
+            <a:endParaRPr lang="en-GB" sz="1800" dirty="0">
+              <a:effectLst/>
+              <a:latin typeface="NimbusRomNo9L"/>
+            </a:endParaRPr>
+          </a:p>
+          <a:p>
+            <a:pPr marL="285750" indent="-285750">
+              <a:buFont typeface="Arial" panose="020B0604020202020204" pitchFamily="34" charset="0"/>
+              <a:buChar char="•"/>
+            </a:pPr>
+            <a:endParaRPr lang="en-GB" sz="1800" dirty="0">
+              <a:latin typeface="NimbusRomNo9L"/>
+            </a:endParaRPr>
+          </a:p>
+          <a:p>
+            <a:pPr marL="285750" indent="-285750">
+              <a:buFont typeface="Arial" panose="020B0604020202020204" pitchFamily="34" charset="0"/>
+              <a:buChar char="•"/>
+            </a:pPr>
+            <a:endParaRPr lang="en-GB" dirty="0"/>
+          </a:p>
+          <a:p>
+            <a:endParaRPr lang="en-US" dirty="0"/>
+          </a:p>
+        </p:txBody>
+      </p:sp>
+      <p:pic>
+        <p:nvPicPr>
+          <p:cNvPr id="2" name="Picture 1">
+            <a:extLst>
+              <a:ext uri="{FF2B5EF4-FFF2-40B4-BE49-F238E27FC236}">
+                <a16:creationId xmlns:a16="http://schemas.microsoft.com/office/drawing/2014/main" id="{6B637721-D7D3-2C72-43ED-8075FEA73252}"/>
+              </a:ext>
+            </a:extLst>
+          </p:cNvPr>
+          <p:cNvPicPr>
+            <a:picLocks noChangeAspect="1"/>
+          </p:cNvPicPr>
+          <p:nvPr/>
+        </p:nvPicPr>
+        <p:blipFill>
+          <a:blip r:embed="rId3"/>
+          <a:stretch>
+            <a:fillRect/>
+          </a:stretch>
+        </p:blipFill>
+        <p:spPr>
+          <a:xfrm>
+            <a:off x="571500" y="1817511"/>
+            <a:ext cx="7772400" cy="1698831"/>
+          </a:xfrm>
+          <a:prstGeom prst="rect">
+            <a:avLst/>
+          </a:prstGeom>
+        </p:spPr>
+      </p:pic>
+      <p:pic>
+        <p:nvPicPr>
+          <p:cNvPr id="6" name="Picture 5">
+            <a:extLst>
+              <a:ext uri="{FF2B5EF4-FFF2-40B4-BE49-F238E27FC236}">
+                <a16:creationId xmlns:a16="http://schemas.microsoft.com/office/drawing/2014/main" id="{72DF0193-4056-7BB5-1045-04E18D7F5E3E}"/>
+              </a:ext>
+            </a:extLst>
+          </p:cNvPr>
+          <p:cNvPicPr>
+            <a:picLocks noChangeAspect="1"/>
+          </p:cNvPicPr>
+          <p:nvPr/>
+        </p:nvPicPr>
+        <p:blipFill>
+          <a:blip r:embed="rId4"/>
+          <a:stretch>
+            <a:fillRect/>
+          </a:stretch>
+        </p:blipFill>
+        <p:spPr>
+          <a:xfrm>
+            <a:off x="571500" y="4022835"/>
+            <a:ext cx="7772400" cy="1662333"/>
+          </a:xfrm>
+          <a:prstGeom prst="rect">
+            <a:avLst/>
+          </a:prstGeom>
+        </p:spPr>
+      </p:pic>
+      <p:sp>
+        <p:nvSpPr>
+          <p:cNvPr id="7" name="TextBox 6">
+            <a:extLst>
+              <a:ext uri="{FF2B5EF4-FFF2-40B4-BE49-F238E27FC236}">
+                <a16:creationId xmlns:a16="http://schemas.microsoft.com/office/drawing/2014/main" id="{016E85BC-AEF5-D814-3378-7078116E2C6E}"/>
+              </a:ext>
+            </a:extLst>
+          </p:cNvPr>
+          <p:cNvSpPr txBox="1"/>
+          <p:nvPr/>
+        </p:nvSpPr>
+        <p:spPr>
+          <a:xfrm>
+            <a:off x="2703083" y="1541506"/>
+            <a:ext cx="3509230" cy="573042"/>
+          </a:xfrm>
+          <a:prstGeom prst="rect">
+            <a:avLst/>
+          </a:prstGeom>
+          <a:noFill/>
+        </p:spPr>
+        <p:txBody>
+          <a:bodyPr wrap="none" lIns="0" tIns="0" rIns="0" bIns="0" rtlCol="0">
+            <a:spAutoFit/>
+          </a:bodyPr>
+          <a:lstStyle/>
+          <a:p>
+            <a:pPr>
+              <a:lnSpc>
+                <a:spcPct val="114000"/>
+              </a:lnSpc>
+            </a:pPr>
+            <a:r>
+              <a:rPr lang="en-GB" sz="1800" dirty="0">
+                <a:effectLst/>
+                <a:latin typeface="NimbusRomNo9L"/>
+              </a:rPr>
+              <a:t>3D-RETR-Avg-Fusion Training Process </a:t>
+            </a:r>
+            <a:endParaRPr lang="en-GB" sz="1600" dirty="0"/>
+          </a:p>
+          <a:p>
+            <a:pPr>
+              <a:lnSpc>
+                <a:spcPct val="114000"/>
+              </a:lnSpc>
+            </a:pPr>
+            <a:endParaRPr lang="en-US" sz="1600" dirty="0" err="1">
+              <a:latin typeface="+mn-lt"/>
+            </a:endParaRPr>
+          </a:p>
+        </p:txBody>
+      </p:sp>
+      <p:sp>
+        <p:nvSpPr>
+          <p:cNvPr id="8" name="TextBox 7">
+            <a:extLst>
+              <a:ext uri="{FF2B5EF4-FFF2-40B4-BE49-F238E27FC236}">
+                <a16:creationId xmlns:a16="http://schemas.microsoft.com/office/drawing/2014/main" id="{C9685438-81C6-29F1-DE97-5CC9665EAA75}"/>
+              </a:ext>
+            </a:extLst>
+          </p:cNvPr>
+          <p:cNvSpPr txBox="1"/>
+          <p:nvPr/>
+        </p:nvSpPr>
+        <p:spPr>
+          <a:xfrm>
+            <a:off x="2624825" y="3724585"/>
+            <a:ext cx="3665747" cy="534249"/>
+          </a:xfrm>
+          <a:prstGeom prst="rect">
+            <a:avLst/>
+          </a:prstGeom>
+          <a:noFill/>
+        </p:spPr>
+        <p:txBody>
+          <a:bodyPr wrap="none" lIns="0" tIns="0" rIns="0" bIns="0" rtlCol="0">
+            <a:spAutoFit/>
+          </a:bodyPr>
+          <a:lstStyle/>
+          <a:p>
+            <a:r>
+              <a:rPr lang="en-GB" sz="1800" dirty="0">
+                <a:effectLst/>
+                <a:latin typeface="NimbusRomNo9L"/>
+              </a:rPr>
+              <a:t>3D-RETR-Deep-Fusion Training Process </a:t>
+            </a:r>
+            <a:endParaRPr lang="en-GB" dirty="0"/>
+          </a:p>
+          <a:p>
+            <a:pPr>
+              <a:lnSpc>
+                <a:spcPct val="114000"/>
+              </a:lnSpc>
+            </a:pPr>
+            <a:endParaRPr lang="en-US" sz="1600" dirty="0" err="1">
+              <a:latin typeface="+mn-lt"/>
+            </a:endParaRPr>
+          </a:p>
+        </p:txBody>
+      </p:sp>
+    </p:spTree>
+    <p:extLst>
+      <p:ext uri="{BB962C8B-B14F-4D97-AF65-F5344CB8AC3E}">
+        <p14:creationId xmlns:p14="http://schemas.microsoft.com/office/powerpoint/2010/main" val="136888164"/>
+      </p:ext>
+    </p:extLst>
+  </p:cSld>
+  <p:clrMapOvr>
+    <a:masterClrMapping/>
+  </p:clrMapOvr>
+</p:sld>
+</file>
+
+<file path=ppt/slides/slide8.xml><?xml version="1.0" encoding="utf-8"?>
+<p:sld xmlns:a="http://schemas.openxmlformats.org/drawingml/2006/main" xmlns:r="http://schemas.openxmlformats.org/officeDocument/2006/relationships" xmlns:p="http://schemas.openxmlformats.org/presentationml/2006/main">
+  <p:cSld>
+    <p:spTree>
+      <p:nvGrpSpPr>
+        <p:cNvPr id="1" name=""/>
+        <p:cNvGrpSpPr/>
+        <p:nvPr/>
+      </p:nvGrpSpPr>
+      <p:grpSpPr>
+        <a:xfrm>
+          <a:off x="0" y="0"/>
+          <a:ext cx="0" cy="0"/>
+          <a:chOff x="0" y="0"/>
+          <a:chExt cx="0" cy="0"/>
+        </a:xfrm>
+      </p:grpSpPr>
+      <p:sp>
+        <p:nvSpPr>
+          <p:cNvPr id="3" name="Slide Number Placeholder 2">
+            <a:extLst>
+              <a:ext uri="{FF2B5EF4-FFF2-40B4-BE49-F238E27FC236}">
+                <a16:creationId xmlns:a16="http://schemas.microsoft.com/office/drawing/2014/main" id="{A94A60AC-B9B3-AF59-E847-984597B2945A}"/>
+              </a:ext>
+            </a:extLst>
+          </p:cNvPr>
+          <p:cNvSpPr>
+            <a:spLocks noGrp="1"/>
+          </p:cNvSpPr>
+          <p:nvPr>
+            <p:ph type="sldNum" sz="quarter" idx="11"/>
+          </p:nvPr>
+        </p:nvSpPr>
+        <p:spPr/>
+        <p:txBody>
+          <a:bodyPr/>
+          <a:lstStyle/>
+          <a:p>
+            <a:fld id="{CE58CB1E-F828-4F11-99E0-327109AF9DA4}" type="slidenum">
+              <a:rPr lang="de-DE" smtClean="0"/>
+              <a:pPr/>
+              <a:t>8</a:t>
+            </a:fld>
+            <a:endParaRPr lang="de-DE" dirty="0"/>
+          </a:p>
+        </p:txBody>
+      </p:sp>
+      <p:sp>
+        <p:nvSpPr>
+          <p:cNvPr id="5" name="Title 4">
+            <a:extLst>
+              <a:ext uri="{FF2B5EF4-FFF2-40B4-BE49-F238E27FC236}">
+                <a16:creationId xmlns:a16="http://schemas.microsoft.com/office/drawing/2014/main" id="{390DBEAC-D603-E343-552D-9EB20251DA02}"/>
+              </a:ext>
+            </a:extLst>
+          </p:cNvPr>
+          <p:cNvSpPr>
+            <a:spLocks noGrp="1"/>
+          </p:cNvSpPr>
+          <p:nvPr>
+            <p:ph type="title"/>
+          </p:nvPr>
+        </p:nvSpPr>
+        <p:spPr/>
+        <p:txBody>
+          <a:bodyPr/>
+          <a:lstStyle/>
+          <a:p>
+            <a:r>
+              <a:rPr lang="en-US" dirty="0"/>
+              <a:t>Average Fusion Reconstructions</a:t>
+            </a:r>
+          </a:p>
+        </p:txBody>
+      </p:sp>
+      <p:sp>
+        <p:nvSpPr>
+          <p:cNvPr id="4" name="Content Placeholder 3">
+            <a:extLst>
+              <a:ext uri="{FF2B5EF4-FFF2-40B4-BE49-F238E27FC236}">
+                <a16:creationId xmlns:a16="http://schemas.microsoft.com/office/drawing/2014/main" id="{48405292-3E50-4195-8E6A-AAD213C54DC2}"/>
+              </a:ext>
+            </a:extLst>
+          </p:cNvPr>
+          <p:cNvSpPr>
+            <a:spLocks noGrp="1"/>
+          </p:cNvSpPr>
+          <p:nvPr>
+            <p:ph idx="1"/>
+          </p:nvPr>
+        </p:nvSpPr>
+        <p:spPr/>
+        <p:txBody>
+          <a:bodyPr/>
+          <a:lstStyle/>
+          <a:p>
+            <a:pPr marL="461963" lvl="1" indent="-285750">
+              <a:buFont typeface="Arial" panose="020B0604020202020204" pitchFamily="34" charset="0"/>
+              <a:buChar char="•"/>
+            </a:pPr>
+            <a:endParaRPr lang="en-GB" sz="1800" dirty="0">
+              <a:effectLst/>
+              <a:latin typeface="NimbusRomNo9L"/>
+            </a:endParaRPr>
+          </a:p>
+          <a:p>
+            <a:pPr marL="285750" indent="-285750">
+              <a:buFont typeface="Arial" panose="020B0604020202020204" pitchFamily="34" charset="0"/>
+              <a:buChar char="•"/>
+            </a:pPr>
+            <a:endParaRPr lang="en-GB" sz="1800" dirty="0">
+              <a:latin typeface="NimbusRomNo9L"/>
+            </a:endParaRPr>
+          </a:p>
+          <a:p>
+            <a:pPr marL="285750" indent="-285750">
+              <a:buFont typeface="Arial" panose="020B0604020202020204" pitchFamily="34" charset="0"/>
+              <a:buChar char="•"/>
+            </a:pPr>
+            <a:endParaRPr lang="en-GB" dirty="0"/>
+          </a:p>
+          <a:p>
+            <a:endParaRPr lang="en-US" dirty="0"/>
+          </a:p>
+        </p:txBody>
+      </p:sp>
+      <p:pic>
+        <p:nvPicPr>
+          <p:cNvPr id="9" name="Picture 8">
+            <a:extLst>
+              <a:ext uri="{FF2B5EF4-FFF2-40B4-BE49-F238E27FC236}">
+                <a16:creationId xmlns:a16="http://schemas.microsoft.com/office/drawing/2014/main" id="{BD089D93-5F47-820C-A165-26E196C6E722}"/>
+              </a:ext>
+            </a:extLst>
+          </p:cNvPr>
+          <p:cNvPicPr>
+            <a:picLocks noChangeAspect="1"/>
+          </p:cNvPicPr>
+          <p:nvPr/>
+        </p:nvPicPr>
+        <p:blipFill>
+          <a:blip r:embed="rId3"/>
+          <a:stretch>
+            <a:fillRect/>
+          </a:stretch>
+        </p:blipFill>
+        <p:spPr>
+          <a:xfrm>
+            <a:off x="716840" y="1581789"/>
+            <a:ext cx="7710320" cy="4699572"/>
+          </a:xfrm>
+          <a:prstGeom prst="rect">
+            <a:avLst/>
+          </a:prstGeom>
+        </p:spPr>
+      </p:pic>
+    </p:spTree>
+    <p:extLst>
+      <p:ext uri="{BB962C8B-B14F-4D97-AF65-F5344CB8AC3E}">
+        <p14:creationId xmlns:p14="http://schemas.microsoft.com/office/powerpoint/2010/main" val="3394191201"/>
       </p:ext>
     </p:extLst>
   </p:cSld>

</xml_diff>

<commit_message>
Update presentation with results
</commit_message>
<xml_diff>
--- a/Project/Resources/presentation.pptx
+++ b/Project/Resources/presentation.pptx
@@ -10,10 +10,10 @@
     <p:sldMasterId id="2147483697" r:id="rId6"/>
   </p:sldMasterIdLst>
   <p:notesMasterIdLst>
-    <p:notesMasterId r:id="rId15"/>
+    <p:notesMasterId r:id="rId19"/>
   </p:notesMasterIdLst>
   <p:handoutMasterIdLst>
-    <p:handoutMasterId r:id="rId16"/>
+    <p:handoutMasterId r:id="rId20"/>
   </p:handoutMasterIdLst>
   <p:sldIdLst>
     <p:sldId id="355" r:id="rId7"/>
@@ -24,6 +24,10 @@
     <p:sldId id="360" r:id="rId12"/>
     <p:sldId id="361" r:id="rId13"/>
     <p:sldId id="362" r:id="rId14"/>
+    <p:sldId id="363" r:id="rId15"/>
+    <p:sldId id="364" r:id="rId16"/>
+    <p:sldId id="366" r:id="rId17"/>
+    <p:sldId id="365" r:id="rId18"/>
   </p:sldIdLst>
   <p:sldSz cx="9144000" cy="6858000" type="screen4x3"/>
   <p:notesSz cx="9925050" cy="6665913"/>
@@ -1412,6 +1416,366 @@
 </p:notes>
 </file>
 
+<file path=ppt/notesSlides/notesSlide6.xml><?xml version="1.0" encoding="utf-8"?>
+<p:notes xmlns:a="http://schemas.openxmlformats.org/drawingml/2006/main" xmlns:r="http://schemas.openxmlformats.org/officeDocument/2006/relationships" xmlns:p="http://schemas.openxmlformats.org/presentationml/2006/main">
+  <p:cSld>
+    <p:spTree>
+      <p:nvGrpSpPr>
+        <p:cNvPr id="1" name=""/>
+        <p:cNvGrpSpPr/>
+        <p:nvPr/>
+      </p:nvGrpSpPr>
+      <p:grpSpPr>
+        <a:xfrm>
+          <a:off x="0" y="0"/>
+          <a:ext cx="0" cy="0"/>
+          <a:chOff x="0" y="0"/>
+          <a:chExt cx="0" cy="0"/>
+        </a:xfrm>
+      </p:grpSpPr>
+      <p:sp>
+        <p:nvSpPr>
+          <p:cNvPr id="2" name="Slide Image Placeholder 1"/>
+          <p:cNvSpPr>
+            <a:spLocks noGrp="1" noRot="1" noChangeAspect="1"/>
+          </p:cNvSpPr>
+          <p:nvPr>
+            <p:ph type="sldImg"/>
+          </p:nvPr>
+        </p:nvSpPr>
+        <p:spPr/>
+      </p:sp>
+      <p:sp>
+        <p:nvSpPr>
+          <p:cNvPr id="3" name="Notes Placeholder 2"/>
+          <p:cNvSpPr>
+            <a:spLocks noGrp="1"/>
+          </p:cNvSpPr>
+          <p:nvPr>
+            <p:ph type="body" idx="1"/>
+          </p:nvPr>
+        </p:nvSpPr>
+        <p:spPr/>
+        <p:txBody>
+          <a:bodyPr/>
+          <a:lstStyle/>
+          <a:p>
+            <a:endParaRPr lang="en-US" dirty="0"/>
+          </a:p>
+        </p:txBody>
+      </p:sp>
+      <p:sp>
+        <p:nvSpPr>
+          <p:cNvPr id="4" name="Slide Number Placeholder 3"/>
+          <p:cNvSpPr>
+            <a:spLocks noGrp="1"/>
+          </p:cNvSpPr>
+          <p:nvPr>
+            <p:ph type="sldNum" sz="quarter" idx="5"/>
+          </p:nvPr>
+        </p:nvSpPr>
+        <p:spPr/>
+        <p:txBody>
+          <a:bodyPr/>
+          <a:lstStyle/>
+          <a:p>
+            <a:pPr>
+              <a:defRPr/>
+            </a:pPr>
+            <a:fld id="{00AFC6D0-44D5-4EB7-828F-6F464F83D79A}" type="slidenum">
+              <a:rPr lang="en-GB" smtClean="0"/>
+              <a:pPr>
+                <a:defRPr/>
+              </a:pPr>
+              <a:t>9</a:t>
+            </a:fld>
+            <a:endParaRPr lang="en-GB"/>
+          </a:p>
+        </p:txBody>
+      </p:sp>
+    </p:spTree>
+    <p:extLst>
+      <p:ext uri="{BB962C8B-B14F-4D97-AF65-F5344CB8AC3E}">
+        <p14:creationId xmlns:p14="http://schemas.microsoft.com/office/powerpoint/2010/main" val="677787956"/>
+      </p:ext>
+    </p:extLst>
+  </p:cSld>
+  <p:clrMapOvr>
+    <a:masterClrMapping/>
+  </p:clrMapOvr>
+</p:notes>
+</file>
+
+<file path=ppt/notesSlides/notesSlide7.xml><?xml version="1.0" encoding="utf-8"?>
+<p:notes xmlns:a="http://schemas.openxmlformats.org/drawingml/2006/main" xmlns:r="http://schemas.openxmlformats.org/officeDocument/2006/relationships" xmlns:p="http://schemas.openxmlformats.org/presentationml/2006/main">
+  <p:cSld>
+    <p:spTree>
+      <p:nvGrpSpPr>
+        <p:cNvPr id="1" name=""/>
+        <p:cNvGrpSpPr/>
+        <p:nvPr/>
+      </p:nvGrpSpPr>
+      <p:grpSpPr>
+        <a:xfrm>
+          <a:off x="0" y="0"/>
+          <a:ext cx="0" cy="0"/>
+          <a:chOff x="0" y="0"/>
+          <a:chExt cx="0" cy="0"/>
+        </a:xfrm>
+      </p:grpSpPr>
+      <p:sp>
+        <p:nvSpPr>
+          <p:cNvPr id="2" name="Slide Image Placeholder 1"/>
+          <p:cNvSpPr>
+            <a:spLocks noGrp="1" noRot="1" noChangeAspect="1"/>
+          </p:cNvSpPr>
+          <p:nvPr>
+            <p:ph type="sldImg"/>
+          </p:nvPr>
+        </p:nvSpPr>
+        <p:spPr/>
+      </p:sp>
+      <p:sp>
+        <p:nvSpPr>
+          <p:cNvPr id="3" name="Notes Placeholder 2"/>
+          <p:cNvSpPr>
+            <a:spLocks noGrp="1"/>
+          </p:cNvSpPr>
+          <p:nvPr>
+            <p:ph type="body" idx="1"/>
+          </p:nvPr>
+        </p:nvSpPr>
+        <p:spPr/>
+        <p:txBody>
+          <a:bodyPr/>
+          <a:lstStyle/>
+          <a:p>
+            <a:endParaRPr lang="en-US" dirty="0"/>
+          </a:p>
+        </p:txBody>
+      </p:sp>
+      <p:sp>
+        <p:nvSpPr>
+          <p:cNvPr id="4" name="Slide Number Placeholder 3"/>
+          <p:cNvSpPr>
+            <a:spLocks noGrp="1"/>
+          </p:cNvSpPr>
+          <p:nvPr>
+            <p:ph type="sldNum" sz="quarter" idx="5"/>
+          </p:nvPr>
+        </p:nvSpPr>
+        <p:spPr/>
+        <p:txBody>
+          <a:bodyPr/>
+          <a:lstStyle/>
+          <a:p>
+            <a:pPr>
+              <a:defRPr/>
+            </a:pPr>
+            <a:fld id="{00AFC6D0-44D5-4EB7-828F-6F464F83D79A}" type="slidenum">
+              <a:rPr lang="en-GB" smtClean="0"/>
+              <a:pPr>
+                <a:defRPr/>
+              </a:pPr>
+              <a:t>10</a:t>
+            </a:fld>
+            <a:endParaRPr lang="en-GB"/>
+          </a:p>
+        </p:txBody>
+      </p:sp>
+    </p:spTree>
+    <p:extLst>
+      <p:ext uri="{BB962C8B-B14F-4D97-AF65-F5344CB8AC3E}">
+        <p14:creationId xmlns:p14="http://schemas.microsoft.com/office/powerpoint/2010/main" val="1249883960"/>
+      </p:ext>
+    </p:extLst>
+  </p:cSld>
+  <p:clrMapOvr>
+    <a:masterClrMapping/>
+  </p:clrMapOvr>
+</p:notes>
+</file>
+
+<file path=ppt/notesSlides/notesSlide8.xml><?xml version="1.0" encoding="utf-8"?>
+<p:notes xmlns:a="http://schemas.openxmlformats.org/drawingml/2006/main" xmlns:r="http://schemas.openxmlformats.org/officeDocument/2006/relationships" xmlns:p="http://schemas.openxmlformats.org/presentationml/2006/main">
+  <p:cSld>
+    <p:spTree>
+      <p:nvGrpSpPr>
+        <p:cNvPr id="1" name=""/>
+        <p:cNvGrpSpPr/>
+        <p:nvPr/>
+      </p:nvGrpSpPr>
+      <p:grpSpPr>
+        <a:xfrm>
+          <a:off x="0" y="0"/>
+          <a:ext cx="0" cy="0"/>
+          <a:chOff x="0" y="0"/>
+          <a:chExt cx="0" cy="0"/>
+        </a:xfrm>
+      </p:grpSpPr>
+      <p:sp>
+        <p:nvSpPr>
+          <p:cNvPr id="2" name="Slide Image Placeholder 1"/>
+          <p:cNvSpPr>
+            <a:spLocks noGrp="1" noRot="1" noChangeAspect="1"/>
+          </p:cNvSpPr>
+          <p:nvPr>
+            <p:ph type="sldImg"/>
+          </p:nvPr>
+        </p:nvSpPr>
+        <p:spPr/>
+      </p:sp>
+      <p:sp>
+        <p:nvSpPr>
+          <p:cNvPr id="3" name="Notes Placeholder 2"/>
+          <p:cNvSpPr>
+            <a:spLocks noGrp="1"/>
+          </p:cNvSpPr>
+          <p:nvPr>
+            <p:ph type="body" idx="1"/>
+          </p:nvPr>
+        </p:nvSpPr>
+        <p:spPr/>
+        <p:txBody>
+          <a:bodyPr/>
+          <a:lstStyle/>
+          <a:p>
+            <a:endParaRPr lang="en-US" dirty="0"/>
+          </a:p>
+        </p:txBody>
+      </p:sp>
+      <p:sp>
+        <p:nvSpPr>
+          <p:cNvPr id="4" name="Slide Number Placeholder 3"/>
+          <p:cNvSpPr>
+            <a:spLocks noGrp="1"/>
+          </p:cNvSpPr>
+          <p:nvPr>
+            <p:ph type="sldNum" sz="quarter" idx="5"/>
+          </p:nvPr>
+        </p:nvSpPr>
+        <p:spPr/>
+        <p:txBody>
+          <a:bodyPr/>
+          <a:lstStyle/>
+          <a:p>
+            <a:pPr>
+              <a:defRPr/>
+            </a:pPr>
+            <a:fld id="{00AFC6D0-44D5-4EB7-828F-6F464F83D79A}" type="slidenum">
+              <a:rPr lang="en-GB" smtClean="0"/>
+              <a:pPr>
+                <a:defRPr/>
+              </a:pPr>
+              <a:t>11</a:t>
+            </a:fld>
+            <a:endParaRPr lang="en-GB"/>
+          </a:p>
+        </p:txBody>
+      </p:sp>
+    </p:spTree>
+    <p:extLst>
+      <p:ext uri="{BB962C8B-B14F-4D97-AF65-F5344CB8AC3E}">
+        <p14:creationId xmlns:p14="http://schemas.microsoft.com/office/powerpoint/2010/main" val="4177799423"/>
+      </p:ext>
+    </p:extLst>
+  </p:cSld>
+  <p:clrMapOvr>
+    <a:masterClrMapping/>
+  </p:clrMapOvr>
+</p:notes>
+</file>
+
+<file path=ppt/notesSlides/notesSlide9.xml><?xml version="1.0" encoding="utf-8"?>
+<p:notes xmlns:a="http://schemas.openxmlformats.org/drawingml/2006/main" xmlns:r="http://schemas.openxmlformats.org/officeDocument/2006/relationships" xmlns:p="http://schemas.openxmlformats.org/presentationml/2006/main">
+  <p:cSld>
+    <p:spTree>
+      <p:nvGrpSpPr>
+        <p:cNvPr id="1" name=""/>
+        <p:cNvGrpSpPr/>
+        <p:nvPr/>
+      </p:nvGrpSpPr>
+      <p:grpSpPr>
+        <a:xfrm>
+          <a:off x="0" y="0"/>
+          <a:ext cx="0" cy="0"/>
+          <a:chOff x="0" y="0"/>
+          <a:chExt cx="0" cy="0"/>
+        </a:xfrm>
+      </p:grpSpPr>
+      <p:sp>
+        <p:nvSpPr>
+          <p:cNvPr id="2" name="Slide Image Placeholder 1"/>
+          <p:cNvSpPr>
+            <a:spLocks noGrp="1" noRot="1" noChangeAspect="1"/>
+          </p:cNvSpPr>
+          <p:nvPr>
+            <p:ph type="sldImg"/>
+          </p:nvPr>
+        </p:nvSpPr>
+        <p:spPr/>
+      </p:sp>
+      <p:sp>
+        <p:nvSpPr>
+          <p:cNvPr id="3" name="Notes Placeholder 2"/>
+          <p:cNvSpPr>
+            <a:spLocks noGrp="1"/>
+          </p:cNvSpPr>
+          <p:nvPr>
+            <p:ph type="body" idx="1"/>
+          </p:nvPr>
+        </p:nvSpPr>
+        <p:spPr/>
+        <p:txBody>
+          <a:bodyPr/>
+          <a:lstStyle/>
+          <a:p>
+            <a:endParaRPr lang="en-US" dirty="0"/>
+          </a:p>
+        </p:txBody>
+      </p:sp>
+      <p:sp>
+        <p:nvSpPr>
+          <p:cNvPr id="4" name="Slide Number Placeholder 3"/>
+          <p:cNvSpPr>
+            <a:spLocks noGrp="1"/>
+          </p:cNvSpPr>
+          <p:nvPr>
+            <p:ph type="sldNum" sz="quarter" idx="5"/>
+          </p:nvPr>
+        </p:nvSpPr>
+        <p:spPr/>
+        <p:txBody>
+          <a:bodyPr/>
+          <a:lstStyle/>
+          <a:p>
+            <a:pPr>
+              <a:defRPr/>
+            </a:pPr>
+            <a:fld id="{00AFC6D0-44D5-4EB7-828F-6F464F83D79A}" type="slidenum">
+              <a:rPr lang="en-GB" smtClean="0"/>
+              <a:pPr>
+                <a:defRPr/>
+              </a:pPr>
+              <a:t>12</a:t>
+            </a:fld>
+            <a:endParaRPr lang="en-GB"/>
+          </a:p>
+        </p:txBody>
+      </p:sp>
+    </p:spTree>
+    <p:extLst>
+      <p:ext uri="{BB962C8B-B14F-4D97-AF65-F5344CB8AC3E}">
+        <p14:creationId xmlns:p14="http://schemas.microsoft.com/office/powerpoint/2010/main" val="3113564825"/>
+      </p:ext>
+    </p:extLst>
+  </p:cSld>
+  <p:clrMapOvr>
+    <a:masterClrMapping/>
+  </p:clrMapOvr>
+</p:notes>
+</file>
+
 <file path=ppt/slideLayouts/slideLayout1.xml><?xml version="1.0" encoding="utf-8"?>
 <p:sldLayout xmlns:a="http://schemas.openxmlformats.org/drawingml/2006/main" xmlns:r="http://schemas.openxmlformats.org/officeDocument/2006/relationships" xmlns:p="http://schemas.openxmlformats.org/presentationml/2006/main" preserve="1" userDrawn="1">
   <p:cSld name="Start">
@@ -9755,6 +10119,598 @@
         </p:txBody>
       </p:sp>
     </p:spTree>
+  </p:cSld>
+  <p:clrMapOvr>
+    <a:masterClrMapping/>
+  </p:clrMapOvr>
+</p:sld>
+</file>
+
+<file path=ppt/slides/slide10.xml><?xml version="1.0" encoding="utf-8"?>
+<p:sld xmlns:a="http://schemas.openxmlformats.org/drawingml/2006/main" xmlns:r="http://schemas.openxmlformats.org/officeDocument/2006/relationships" xmlns:p="http://schemas.openxmlformats.org/presentationml/2006/main">
+  <p:cSld>
+    <p:spTree>
+      <p:nvGrpSpPr>
+        <p:cNvPr id="1" name=""/>
+        <p:cNvGrpSpPr/>
+        <p:nvPr/>
+      </p:nvGrpSpPr>
+      <p:grpSpPr>
+        <a:xfrm>
+          <a:off x="0" y="0"/>
+          <a:ext cx="0" cy="0"/>
+          <a:chOff x="0" y="0"/>
+          <a:chExt cx="0" cy="0"/>
+        </a:xfrm>
+      </p:grpSpPr>
+      <p:sp>
+        <p:nvSpPr>
+          <p:cNvPr id="3" name="Slide Number Placeholder 2">
+            <a:extLst>
+              <a:ext uri="{FF2B5EF4-FFF2-40B4-BE49-F238E27FC236}">
+                <a16:creationId xmlns:a16="http://schemas.microsoft.com/office/drawing/2014/main" id="{A94A60AC-B9B3-AF59-E847-984597B2945A}"/>
+              </a:ext>
+            </a:extLst>
+          </p:cNvPr>
+          <p:cNvSpPr>
+            <a:spLocks noGrp="1"/>
+          </p:cNvSpPr>
+          <p:nvPr>
+            <p:ph type="sldNum" sz="quarter" idx="11"/>
+          </p:nvPr>
+        </p:nvSpPr>
+        <p:spPr/>
+        <p:txBody>
+          <a:bodyPr/>
+          <a:lstStyle/>
+          <a:p>
+            <a:fld id="{CE58CB1E-F828-4F11-99E0-327109AF9DA4}" type="slidenum">
+              <a:rPr lang="de-DE" smtClean="0"/>
+              <a:pPr/>
+              <a:t>10</a:t>
+            </a:fld>
+            <a:endParaRPr lang="de-DE" dirty="0"/>
+          </a:p>
+        </p:txBody>
+      </p:sp>
+      <p:sp>
+        <p:nvSpPr>
+          <p:cNvPr id="5" name="Title 4">
+            <a:extLst>
+              <a:ext uri="{FF2B5EF4-FFF2-40B4-BE49-F238E27FC236}">
+                <a16:creationId xmlns:a16="http://schemas.microsoft.com/office/drawing/2014/main" id="{390DBEAC-D603-E343-552D-9EB20251DA02}"/>
+              </a:ext>
+            </a:extLst>
+          </p:cNvPr>
+          <p:cNvSpPr>
+            <a:spLocks noGrp="1"/>
+          </p:cNvSpPr>
+          <p:nvPr>
+            <p:ph type="title"/>
+          </p:nvPr>
+        </p:nvSpPr>
+        <p:spPr/>
+        <p:txBody>
+          <a:bodyPr/>
+          <a:lstStyle/>
+          <a:p>
+            <a:r>
+              <a:rPr lang="en-US" dirty="0"/>
+              <a:t>Results</a:t>
+            </a:r>
+          </a:p>
+        </p:txBody>
+      </p:sp>
+      <p:sp>
+        <p:nvSpPr>
+          <p:cNvPr id="4" name="Content Placeholder 3">
+            <a:extLst>
+              <a:ext uri="{FF2B5EF4-FFF2-40B4-BE49-F238E27FC236}">
+                <a16:creationId xmlns:a16="http://schemas.microsoft.com/office/drawing/2014/main" id="{48405292-3E50-4195-8E6A-AAD213C54DC2}"/>
+              </a:ext>
+            </a:extLst>
+          </p:cNvPr>
+          <p:cNvSpPr>
+            <a:spLocks noGrp="1"/>
+          </p:cNvSpPr>
+          <p:nvPr>
+            <p:ph idx="1"/>
+          </p:nvPr>
+        </p:nvSpPr>
+        <p:spPr>
+          <a:xfrm>
+            <a:off x="319090" y="2880362"/>
+            <a:ext cx="8508999" cy="3581398"/>
+          </a:xfrm>
+        </p:spPr>
+        <p:txBody>
+          <a:bodyPr/>
+          <a:lstStyle/>
+          <a:p>
+            <a:pPr marL="461963" lvl="1" indent="-285750">
+              <a:buFont typeface="Arial" panose="020B0604020202020204" pitchFamily="34" charset="0"/>
+              <a:buChar char="•"/>
+            </a:pPr>
+            <a:endParaRPr lang="en-GB" sz="1800" dirty="0">
+              <a:effectLst/>
+              <a:latin typeface="NimbusRomNo9L"/>
+            </a:endParaRPr>
+          </a:p>
+          <a:p>
+            <a:pPr marL="285750" indent="-285750">
+              <a:buFont typeface="Arial" panose="020B0604020202020204" pitchFamily="34" charset="0"/>
+              <a:buChar char="•"/>
+            </a:pPr>
+            <a:endParaRPr lang="en-GB" sz="1800" dirty="0">
+              <a:latin typeface="NimbusRomNo9L"/>
+            </a:endParaRPr>
+          </a:p>
+          <a:p>
+            <a:pPr marL="285750" indent="-285750">
+              <a:buFont typeface="Arial" panose="020B0604020202020204" pitchFamily="34" charset="0"/>
+              <a:buChar char="•"/>
+            </a:pPr>
+            <a:endParaRPr lang="en-GB" dirty="0"/>
+          </a:p>
+          <a:p>
+            <a:endParaRPr lang="en-US" dirty="0"/>
+          </a:p>
+        </p:txBody>
+      </p:sp>
+      <p:sp>
+        <p:nvSpPr>
+          <p:cNvPr id="6" name="TextBox 5">
+            <a:extLst>
+              <a:ext uri="{FF2B5EF4-FFF2-40B4-BE49-F238E27FC236}">
+                <a16:creationId xmlns:a16="http://schemas.microsoft.com/office/drawing/2014/main" id="{2C9A65F4-3E8D-4940-17F3-4D506B0EA01F}"/>
+              </a:ext>
+            </a:extLst>
+          </p:cNvPr>
+          <p:cNvSpPr txBox="1"/>
+          <p:nvPr/>
+        </p:nvSpPr>
+        <p:spPr>
+          <a:xfrm>
+            <a:off x="385763" y="1628775"/>
+            <a:ext cx="8441171" cy="537968"/>
+          </a:xfrm>
+          <a:prstGeom prst="rect">
+            <a:avLst/>
+          </a:prstGeom>
+          <a:noFill/>
+        </p:spPr>
+        <p:txBody>
+          <a:bodyPr wrap="square" lIns="0" tIns="0" rIns="0" bIns="0" rtlCol="0">
+            <a:spAutoFit/>
+          </a:bodyPr>
+          <a:lstStyle/>
+          <a:p>
+            <a:pPr>
+              <a:lnSpc>
+                <a:spcPct val="114000"/>
+              </a:lnSpc>
+            </a:pPr>
+            <a:r>
+              <a:rPr lang="en-US" sz="1600" dirty="0">
+                <a:latin typeface="+mn-lt"/>
+              </a:rPr>
+              <a:t>Performance results of various models in the multi-view setting, measured by the overall Intersection over Union (</a:t>
+            </a:r>
+            <a:r>
+              <a:rPr lang="en-US" sz="1600" dirty="0" err="1">
+                <a:latin typeface="+mn-lt"/>
+              </a:rPr>
+              <a:t>IoU</a:t>
+            </a:r>
+            <a:r>
+              <a:rPr lang="en-US" sz="1600" dirty="0">
+                <a:latin typeface="+mn-lt"/>
+              </a:rPr>
+              <a:t>) across all classes.</a:t>
+            </a:r>
+          </a:p>
+        </p:txBody>
+      </p:sp>
+      <p:pic>
+        <p:nvPicPr>
+          <p:cNvPr id="7" name="Picture 6">
+            <a:extLst>
+              <a:ext uri="{FF2B5EF4-FFF2-40B4-BE49-F238E27FC236}">
+                <a16:creationId xmlns:a16="http://schemas.microsoft.com/office/drawing/2014/main" id="{6F6493E2-48F2-23E6-787D-6D0319822C62}"/>
+              </a:ext>
+            </a:extLst>
+          </p:cNvPr>
+          <p:cNvPicPr>
+            <a:picLocks noChangeAspect="1"/>
+          </p:cNvPicPr>
+          <p:nvPr/>
+        </p:nvPicPr>
+        <p:blipFill>
+          <a:blip r:embed="rId3"/>
+          <a:stretch>
+            <a:fillRect/>
+          </a:stretch>
+        </p:blipFill>
+        <p:spPr>
+          <a:xfrm>
+            <a:off x="295089" y="3012531"/>
+            <a:ext cx="8529821" cy="1259741"/>
+          </a:xfrm>
+          <a:prstGeom prst="rect">
+            <a:avLst/>
+          </a:prstGeom>
+        </p:spPr>
+      </p:pic>
+    </p:spTree>
+    <p:extLst>
+      <p:ext uri="{BB962C8B-B14F-4D97-AF65-F5344CB8AC3E}">
+        <p14:creationId xmlns:p14="http://schemas.microsoft.com/office/powerpoint/2010/main" val="3165445263"/>
+      </p:ext>
+    </p:extLst>
+  </p:cSld>
+  <p:clrMapOvr>
+    <a:masterClrMapping/>
+  </p:clrMapOvr>
+</p:sld>
+</file>
+
+<file path=ppt/slides/slide11.xml><?xml version="1.0" encoding="utf-8"?>
+<p:sld xmlns:a="http://schemas.openxmlformats.org/drawingml/2006/main" xmlns:r="http://schemas.openxmlformats.org/officeDocument/2006/relationships" xmlns:p="http://schemas.openxmlformats.org/presentationml/2006/main">
+  <p:cSld>
+    <p:spTree>
+      <p:nvGrpSpPr>
+        <p:cNvPr id="1" name=""/>
+        <p:cNvGrpSpPr/>
+        <p:nvPr/>
+      </p:nvGrpSpPr>
+      <p:grpSpPr>
+        <a:xfrm>
+          <a:off x="0" y="0"/>
+          <a:ext cx="0" cy="0"/>
+          <a:chOff x="0" y="0"/>
+          <a:chExt cx="0" cy="0"/>
+        </a:xfrm>
+      </p:grpSpPr>
+      <p:sp>
+        <p:nvSpPr>
+          <p:cNvPr id="3" name="Slide Number Placeholder 2">
+            <a:extLst>
+              <a:ext uri="{FF2B5EF4-FFF2-40B4-BE49-F238E27FC236}">
+                <a16:creationId xmlns:a16="http://schemas.microsoft.com/office/drawing/2014/main" id="{A94A60AC-B9B3-AF59-E847-984597B2945A}"/>
+              </a:ext>
+            </a:extLst>
+          </p:cNvPr>
+          <p:cNvSpPr>
+            <a:spLocks noGrp="1"/>
+          </p:cNvSpPr>
+          <p:nvPr>
+            <p:ph type="sldNum" sz="quarter" idx="11"/>
+          </p:nvPr>
+        </p:nvSpPr>
+        <p:spPr/>
+        <p:txBody>
+          <a:bodyPr/>
+          <a:lstStyle/>
+          <a:p>
+            <a:fld id="{CE58CB1E-F828-4F11-99E0-327109AF9DA4}" type="slidenum">
+              <a:rPr lang="de-DE" smtClean="0"/>
+              <a:pPr/>
+              <a:t>11</a:t>
+            </a:fld>
+            <a:endParaRPr lang="de-DE" dirty="0"/>
+          </a:p>
+        </p:txBody>
+      </p:sp>
+      <p:sp>
+        <p:nvSpPr>
+          <p:cNvPr id="9" name="TextBox 8">
+            <a:extLst>
+              <a:ext uri="{FF2B5EF4-FFF2-40B4-BE49-F238E27FC236}">
+                <a16:creationId xmlns:a16="http://schemas.microsoft.com/office/drawing/2014/main" id="{3F2376FE-5249-9664-3A64-1EE8181EA4C2}"/>
+              </a:ext>
+            </a:extLst>
+          </p:cNvPr>
+          <p:cNvSpPr txBox="1"/>
+          <p:nvPr/>
+        </p:nvSpPr>
+        <p:spPr>
+          <a:xfrm>
+            <a:off x="1125140" y="2521744"/>
+            <a:ext cx="6893719" cy="1543436"/>
+          </a:xfrm>
+          <a:prstGeom prst="rect">
+            <a:avLst/>
+          </a:prstGeom>
+          <a:noFill/>
+        </p:spPr>
+        <p:txBody>
+          <a:bodyPr wrap="square" lIns="0" tIns="0" rIns="0" bIns="0" rtlCol="0">
+            <a:spAutoFit/>
+          </a:bodyPr>
+          <a:lstStyle/>
+          <a:p>
+            <a:pPr>
+              <a:lnSpc>
+                <a:spcPct val="114000"/>
+              </a:lnSpc>
+            </a:pPr>
+            <a:r>
+              <a:rPr lang="en-US" sz="9600" b="1" dirty="0">
+                <a:latin typeface="+mj-lt"/>
+                <a:ea typeface="Apple Color Emoji" pitchFamily="2" charset="0"/>
+              </a:rPr>
+              <a:t>Thank You!</a:t>
+            </a:r>
+          </a:p>
+        </p:txBody>
+      </p:sp>
+    </p:spTree>
+    <p:extLst>
+      <p:ext uri="{BB962C8B-B14F-4D97-AF65-F5344CB8AC3E}">
+        <p14:creationId xmlns:p14="http://schemas.microsoft.com/office/powerpoint/2010/main" val="3532066813"/>
+      </p:ext>
+    </p:extLst>
+  </p:cSld>
+  <p:clrMapOvr>
+    <a:masterClrMapping/>
+  </p:clrMapOvr>
+</p:sld>
+</file>
+
+<file path=ppt/slides/slide12.xml><?xml version="1.0" encoding="utf-8"?>
+<p:sld xmlns:a="http://schemas.openxmlformats.org/drawingml/2006/main" xmlns:r="http://schemas.openxmlformats.org/officeDocument/2006/relationships" xmlns:p="http://schemas.openxmlformats.org/presentationml/2006/main">
+  <p:cSld>
+    <p:spTree>
+      <p:nvGrpSpPr>
+        <p:cNvPr id="1" name=""/>
+        <p:cNvGrpSpPr/>
+        <p:nvPr/>
+      </p:nvGrpSpPr>
+      <p:grpSpPr>
+        <a:xfrm>
+          <a:off x="0" y="0"/>
+          <a:ext cx="0" cy="0"/>
+          <a:chOff x="0" y="0"/>
+          <a:chExt cx="0" cy="0"/>
+        </a:xfrm>
+      </p:grpSpPr>
+      <p:sp>
+        <p:nvSpPr>
+          <p:cNvPr id="3" name="Slide Number Placeholder 2">
+            <a:extLst>
+              <a:ext uri="{FF2B5EF4-FFF2-40B4-BE49-F238E27FC236}">
+                <a16:creationId xmlns:a16="http://schemas.microsoft.com/office/drawing/2014/main" id="{A94A60AC-B9B3-AF59-E847-984597B2945A}"/>
+              </a:ext>
+            </a:extLst>
+          </p:cNvPr>
+          <p:cNvSpPr>
+            <a:spLocks noGrp="1"/>
+          </p:cNvSpPr>
+          <p:nvPr>
+            <p:ph type="sldNum" sz="quarter" idx="11"/>
+          </p:nvPr>
+        </p:nvSpPr>
+        <p:spPr/>
+        <p:txBody>
+          <a:bodyPr/>
+          <a:lstStyle/>
+          <a:p>
+            <a:fld id="{CE58CB1E-F828-4F11-99E0-327109AF9DA4}" type="slidenum">
+              <a:rPr lang="de-DE" smtClean="0"/>
+              <a:pPr/>
+              <a:t>12</a:t>
+            </a:fld>
+            <a:endParaRPr lang="de-DE" dirty="0"/>
+          </a:p>
+        </p:txBody>
+      </p:sp>
+      <p:sp>
+        <p:nvSpPr>
+          <p:cNvPr id="4" name="Content Placeholder 3">
+            <a:extLst>
+              <a:ext uri="{FF2B5EF4-FFF2-40B4-BE49-F238E27FC236}">
+                <a16:creationId xmlns:a16="http://schemas.microsoft.com/office/drawing/2014/main" id="{48405292-3E50-4195-8E6A-AAD213C54DC2}"/>
+              </a:ext>
+            </a:extLst>
+          </p:cNvPr>
+          <p:cNvSpPr>
+            <a:spLocks noGrp="1"/>
+          </p:cNvSpPr>
+          <p:nvPr>
+            <p:ph idx="1"/>
+          </p:nvPr>
+        </p:nvSpPr>
+        <p:spPr>
+          <a:xfrm>
+            <a:off x="319090" y="2880362"/>
+            <a:ext cx="8508999" cy="3581398"/>
+          </a:xfrm>
+        </p:spPr>
+        <p:txBody>
+          <a:bodyPr/>
+          <a:lstStyle/>
+          <a:p>
+            <a:pPr marL="461963" lvl="1" indent="-285750">
+              <a:buFont typeface="Arial" panose="020B0604020202020204" pitchFamily="34" charset="0"/>
+              <a:buChar char="•"/>
+            </a:pPr>
+            <a:endParaRPr lang="en-GB" sz="1800" dirty="0">
+              <a:effectLst/>
+              <a:latin typeface="NimbusRomNo9L"/>
+            </a:endParaRPr>
+          </a:p>
+          <a:p>
+            <a:pPr marL="285750" indent="-285750">
+              <a:buFont typeface="Arial" panose="020B0604020202020204" pitchFamily="34" charset="0"/>
+              <a:buChar char="•"/>
+            </a:pPr>
+            <a:endParaRPr lang="en-GB" sz="1800" dirty="0">
+              <a:latin typeface="NimbusRomNo9L"/>
+            </a:endParaRPr>
+          </a:p>
+          <a:p>
+            <a:pPr marL="285750" indent="-285750">
+              <a:buFont typeface="Arial" panose="020B0604020202020204" pitchFamily="34" charset="0"/>
+              <a:buChar char="•"/>
+            </a:pPr>
+            <a:endParaRPr lang="en-GB" dirty="0"/>
+          </a:p>
+          <a:p>
+            <a:endParaRPr lang="en-US" dirty="0"/>
+          </a:p>
+        </p:txBody>
+      </p:sp>
+      <p:pic>
+        <p:nvPicPr>
+          <p:cNvPr id="2" name="Grafik 3">
+            <a:extLst>
+              <a:ext uri="{FF2B5EF4-FFF2-40B4-BE49-F238E27FC236}">
+                <a16:creationId xmlns:a16="http://schemas.microsoft.com/office/drawing/2014/main" id="{C0326BE2-A2C4-4960-52F0-400C6BFBFD4E}"/>
+              </a:ext>
+            </a:extLst>
+          </p:cNvPr>
+          <p:cNvPicPr/>
+          <p:nvPr/>
+        </p:nvPicPr>
+        <p:blipFill>
+          <a:blip r:embed="rId3"/>
+          <a:stretch/>
+        </p:blipFill>
+        <p:spPr>
+          <a:xfrm>
+            <a:off x="769883" y="1963186"/>
+            <a:ext cx="3788640" cy="3788640"/>
+          </a:xfrm>
+          <a:prstGeom prst="rect">
+            <a:avLst/>
+          </a:prstGeom>
+          <a:ln>
+            <a:noFill/>
+          </a:ln>
+        </p:spPr>
+      </p:pic>
+      <p:sp>
+        <p:nvSpPr>
+          <p:cNvPr id="8" name="CustomShape 2">
+            <a:extLst>
+              <a:ext uri="{FF2B5EF4-FFF2-40B4-BE49-F238E27FC236}">
+                <a16:creationId xmlns:a16="http://schemas.microsoft.com/office/drawing/2014/main" id="{2E520A5F-EAE8-B098-94FC-B5714FE06D90}"/>
+              </a:ext>
+            </a:extLst>
+          </p:cNvPr>
+          <p:cNvSpPr/>
+          <p:nvPr/>
+        </p:nvSpPr>
+        <p:spPr>
+          <a:xfrm>
+            <a:off x="157163" y="1359106"/>
+            <a:ext cx="8421120" cy="4990680"/>
+          </a:xfrm>
+          <a:prstGeom prst="rect">
+            <a:avLst/>
+          </a:prstGeom>
+          <a:noFill/>
+          <a:ln>
+            <a:noFill/>
+          </a:ln>
+        </p:spPr>
+        <p:style>
+          <a:lnRef idx="0">
+            <a:scrgbClr r="0" g="0" b="0"/>
+          </a:lnRef>
+          <a:fillRef idx="0">
+            <a:scrgbClr r="0" g="0" b="0"/>
+          </a:fillRef>
+          <a:effectRef idx="0">
+            <a:scrgbClr r="0" g="0" b="0"/>
+          </a:effectRef>
+          <a:fontRef idx="minor"/>
+        </p:style>
+        <p:txBody>
+          <a:bodyPr lIns="90000" tIns="45000" rIns="90000" bIns="45000">
+            <a:noAutofit/>
+          </a:bodyPr>
+          <a:lstStyle/>
+          <a:p>
+            <a:pPr algn="ctr">
+              <a:lnSpc>
+                <a:spcPct val="125000"/>
+              </a:lnSpc>
+            </a:pPr>
+            <a:endParaRPr lang="en-US" sz="1800" b="0" strike="noStrike" spc="-1" dirty="0">
+              <a:latin typeface="Arial"/>
+            </a:endParaRPr>
+          </a:p>
+          <a:p>
+            <a:pPr algn="ctr">
+              <a:lnSpc>
+                <a:spcPct val="125000"/>
+              </a:lnSpc>
+            </a:pPr>
+            <a:endParaRPr lang="en-US" sz="1800" b="0" strike="noStrike" spc="-1" dirty="0">
+              <a:latin typeface="Arial"/>
+            </a:endParaRPr>
+          </a:p>
+          <a:p>
+            <a:pPr algn="ctr">
+              <a:lnSpc>
+                <a:spcPct val="125000"/>
+              </a:lnSpc>
+            </a:pPr>
+            <a:endParaRPr lang="en-US" sz="1800" b="0" strike="noStrike" spc="-1" dirty="0">
+              <a:latin typeface="Arial"/>
+            </a:endParaRPr>
+          </a:p>
+          <a:p>
+            <a:pPr marL="720" algn="ctr">
+              <a:lnSpc>
+                <a:spcPct val="125000"/>
+              </a:lnSpc>
+              <a:buClr>
+                <a:srgbClr val="0065BD"/>
+              </a:buClr>
+            </a:pPr>
+            <a:r>
+              <a:rPr lang="de-DE" sz="4000" b="0" strike="noStrike" spc="-1" dirty="0">
+                <a:solidFill>
+                  <a:srgbClr val="000000"/>
+                </a:solidFill>
+                <a:latin typeface="Arial"/>
+              </a:rPr>
+              <a:t>	Questions?</a:t>
+            </a:r>
+            <a:endParaRPr lang="en-US" sz="4000" b="0" strike="noStrike" spc="-1" dirty="0">
+              <a:latin typeface="Arial"/>
+            </a:endParaRPr>
+          </a:p>
+          <a:p>
+            <a:pPr algn="ctr">
+              <a:lnSpc>
+                <a:spcPct val="125000"/>
+              </a:lnSpc>
+            </a:pPr>
+            <a:endParaRPr lang="en-US" sz="4000" b="0" strike="noStrike" spc="-1" dirty="0">
+              <a:latin typeface="Arial"/>
+            </a:endParaRPr>
+          </a:p>
+          <a:p>
+            <a:pPr algn="ctr">
+              <a:lnSpc>
+                <a:spcPct val="125000"/>
+              </a:lnSpc>
+            </a:pPr>
+            <a:endParaRPr lang="en-US" sz="4000" b="0" strike="noStrike" spc="-1" dirty="0">
+              <a:latin typeface="Arial"/>
+            </a:endParaRPr>
+          </a:p>
+        </p:txBody>
+      </p:sp>
+    </p:spTree>
+    <p:extLst>
+      <p:ext uri="{BB962C8B-B14F-4D97-AF65-F5344CB8AC3E}">
+        <p14:creationId xmlns:p14="http://schemas.microsoft.com/office/powerpoint/2010/main" val="1973155786"/>
+      </p:ext>
+    </p:extLst>
   </p:cSld>
   <p:clrMapOvr>
     <a:masterClrMapping/>
@@ -11403,6 +12359,251 @@
     <p:extLst>
       <p:ext uri="{BB962C8B-B14F-4D97-AF65-F5344CB8AC3E}">
         <p14:creationId xmlns:p14="http://schemas.microsoft.com/office/powerpoint/2010/main" val="3394191201"/>
+      </p:ext>
+    </p:extLst>
+  </p:cSld>
+  <p:clrMapOvr>
+    <a:masterClrMapping/>
+  </p:clrMapOvr>
+</p:sld>
+</file>
+
+<file path=ppt/slides/slide9.xml><?xml version="1.0" encoding="utf-8"?>
+<p:sld xmlns:a="http://schemas.openxmlformats.org/drawingml/2006/main" xmlns:r="http://schemas.openxmlformats.org/officeDocument/2006/relationships" xmlns:p="http://schemas.openxmlformats.org/presentationml/2006/main">
+  <p:cSld>
+    <p:spTree>
+      <p:nvGrpSpPr>
+        <p:cNvPr id="1" name=""/>
+        <p:cNvGrpSpPr/>
+        <p:nvPr/>
+      </p:nvGrpSpPr>
+      <p:grpSpPr>
+        <a:xfrm>
+          <a:off x="0" y="0"/>
+          <a:ext cx="0" cy="0"/>
+          <a:chOff x="0" y="0"/>
+          <a:chExt cx="0" cy="0"/>
+        </a:xfrm>
+      </p:grpSpPr>
+      <p:sp>
+        <p:nvSpPr>
+          <p:cNvPr id="3" name="Slide Number Placeholder 2">
+            <a:extLst>
+              <a:ext uri="{FF2B5EF4-FFF2-40B4-BE49-F238E27FC236}">
+                <a16:creationId xmlns:a16="http://schemas.microsoft.com/office/drawing/2014/main" id="{A94A60AC-B9B3-AF59-E847-984597B2945A}"/>
+              </a:ext>
+            </a:extLst>
+          </p:cNvPr>
+          <p:cNvSpPr>
+            <a:spLocks noGrp="1"/>
+          </p:cNvSpPr>
+          <p:nvPr>
+            <p:ph type="sldNum" sz="quarter" idx="11"/>
+          </p:nvPr>
+        </p:nvSpPr>
+        <p:spPr/>
+        <p:txBody>
+          <a:bodyPr/>
+          <a:lstStyle/>
+          <a:p>
+            <a:fld id="{CE58CB1E-F828-4F11-99E0-327109AF9DA4}" type="slidenum">
+              <a:rPr lang="de-DE" smtClean="0"/>
+              <a:pPr/>
+              <a:t>9</a:t>
+            </a:fld>
+            <a:endParaRPr lang="de-DE" dirty="0"/>
+          </a:p>
+        </p:txBody>
+      </p:sp>
+      <p:sp>
+        <p:nvSpPr>
+          <p:cNvPr id="5" name="Title 4">
+            <a:extLst>
+              <a:ext uri="{FF2B5EF4-FFF2-40B4-BE49-F238E27FC236}">
+                <a16:creationId xmlns:a16="http://schemas.microsoft.com/office/drawing/2014/main" id="{390DBEAC-D603-E343-552D-9EB20251DA02}"/>
+              </a:ext>
+            </a:extLst>
+          </p:cNvPr>
+          <p:cNvSpPr>
+            <a:spLocks noGrp="1"/>
+          </p:cNvSpPr>
+          <p:nvPr>
+            <p:ph type="title"/>
+          </p:nvPr>
+        </p:nvSpPr>
+        <p:spPr/>
+        <p:txBody>
+          <a:bodyPr/>
+          <a:lstStyle/>
+          <a:p>
+            <a:r>
+              <a:rPr lang="en-US" dirty="0"/>
+              <a:t>Results</a:t>
+            </a:r>
+          </a:p>
+        </p:txBody>
+      </p:sp>
+      <p:sp>
+        <p:nvSpPr>
+          <p:cNvPr id="4" name="Content Placeholder 3">
+            <a:extLst>
+              <a:ext uri="{FF2B5EF4-FFF2-40B4-BE49-F238E27FC236}">
+                <a16:creationId xmlns:a16="http://schemas.microsoft.com/office/drawing/2014/main" id="{48405292-3E50-4195-8E6A-AAD213C54DC2}"/>
+              </a:ext>
+            </a:extLst>
+          </p:cNvPr>
+          <p:cNvSpPr>
+            <a:spLocks noGrp="1"/>
+          </p:cNvSpPr>
+          <p:nvPr>
+            <p:ph idx="1"/>
+          </p:nvPr>
+        </p:nvSpPr>
+        <p:spPr>
+          <a:xfrm>
+            <a:off x="319090" y="2880362"/>
+            <a:ext cx="8508999" cy="3581398"/>
+          </a:xfrm>
+        </p:spPr>
+        <p:txBody>
+          <a:bodyPr/>
+          <a:lstStyle/>
+          <a:p>
+            <a:pPr marL="461963" lvl="1" indent="-285750">
+              <a:buFont typeface="Arial" panose="020B0604020202020204" pitchFamily="34" charset="0"/>
+              <a:buChar char="•"/>
+            </a:pPr>
+            <a:endParaRPr lang="en-GB" sz="1800" dirty="0">
+              <a:effectLst/>
+              <a:latin typeface="NimbusRomNo9L"/>
+            </a:endParaRPr>
+          </a:p>
+          <a:p>
+            <a:pPr marL="285750" indent="-285750">
+              <a:buFont typeface="Arial" panose="020B0604020202020204" pitchFamily="34" charset="0"/>
+              <a:buChar char="•"/>
+            </a:pPr>
+            <a:endParaRPr lang="en-GB" sz="1800" dirty="0">
+              <a:latin typeface="NimbusRomNo9L"/>
+            </a:endParaRPr>
+          </a:p>
+          <a:p>
+            <a:pPr marL="285750" indent="-285750">
+              <a:buFont typeface="Arial" panose="020B0604020202020204" pitchFamily="34" charset="0"/>
+              <a:buChar char="•"/>
+            </a:pPr>
+            <a:endParaRPr lang="en-GB" dirty="0"/>
+          </a:p>
+          <a:p>
+            <a:endParaRPr lang="en-US" dirty="0"/>
+          </a:p>
+        </p:txBody>
+      </p:sp>
+      <p:pic>
+        <p:nvPicPr>
+          <p:cNvPr id="2" name="Picture 1">
+            <a:extLst>
+              <a:ext uri="{FF2B5EF4-FFF2-40B4-BE49-F238E27FC236}">
+                <a16:creationId xmlns:a16="http://schemas.microsoft.com/office/drawing/2014/main" id="{7BA25099-B072-A949-9E3B-24A96D00C9DC}"/>
+              </a:ext>
+            </a:extLst>
+          </p:cNvPr>
+          <p:cNvPicPr>
+            <a:picLocks noChangeAspect="1"/>
+          </p:cNvPicPr>
+          <p:nvPr/>
+        </p:nvPicPr>
+        <p:blipFill>
+          <a:blip r:embed="rId3"/>
+          <a:stretch>
+            <a:fillRect/>
+          </a:stretch>
+        </p:blipFill>
+        <p:spPr>
+          <a:xfrm>
+            <a:off x="315911" y="2603953"/>
+            <a:ext cx="8216159" cy="3727474"/>
+          </a:xfrm>
+          <a:prstGeom prst="rect">
+            <a:avLst/>
+          </a:prstGeom>
+        </p:spPr>
+      </p:pic>
+      <p:sp>
+        <p:nvSpPr>
+          <p:cNvPr id="6" name="TextBox 5">
+            <a:extLst>
+              <a:ext uri="{FF2B5EF4-FFF2-40B4-BE49-F238E27FC236}">
+                <a16:creationId xmlns:a16="http://schemas.microsoft.com/office/drawing/2014/main" id="{2C9A65F4-3E8D-4940-17F3-4D506B0EA01F}"/>
+              </a:ext>
+            </a:extLst>
+          </p:cNvPr>
+          <p:cNvSpPr txBox="1"/>
+          <p:nvPr/>
+        </p:nvSpPr>
+        <p:spPr>
+          <a:xfrm>
+            <a:off x="385763" y="1628775"/>
+            <a:ext cx="8441171" cy="818686"/>
+          </a:xfrm>
+          <a:prstGeom prst="rect">
+            <a:avLst/>
+          </a:prstGeom>
+          <a:noFill/>
+        </p:spPr>
+        <p:txBody>
+          <a:bodyPr wrap="square" lIns="0" tIns="0" rIns="0" bIns="0" rtlCol="0">
+            <a:spAutoFit/>
+          </a:bodyPr>
+          <a:lstStyle/>
+          <a:p>
+            <a:pPr marL="285750" indent="-285750">
+              <a:lnSpc>
+                <a:spcPct val="114000"/>
+              </a:lnSpc>
+              <a:buFont typeface="Arial" panose="020B0604020202020204" pitchFamily="34" charset="0"/>
+              <a:buChar char="•"/>
+            </a:pPr>
+            <a:r>
+              <a:rPr lang="en-US" sz="1600" dirty="0">
+                <a:latin typeface="+mn-lt"/>
+              </a:rPr>
+              <a:t>As predicted, the deep fusion model underperforms in this scenario </a:t>
+            </a:r>
+          </a:p>
+          <a:p>
+            <a:pPr marL="285750" indent="-285750">
+              <a:lnSpc>
+                <a:spcPct val="114000"/>
+              </a:lnSpc>
+              <a:buFont typeface="Arial" panose="020B0604020202020204" pitchFamily="34" charset="0"/>
+              <a:buChar char="•"/>
+            </a:pPr>
+            <a:endParaRPr lang="en-US" sz="1600" dirty="0">
+              <a:latin typeface="+mn-lt"/>
+            </a:endParaRPr>
+          </a:p>
+          <a:p>
+            <a:pPr marL="285750" indent="-285750">
+              <a:lnSpc>
+                <a:spcPct val="114000"/>
+              </a:lnSpc>
+              <a:buFont typeface="Arial" panose="020B0604020202020204" pitchFamily="34" charset="0"/>
+              <a:buChar char="•"/>
+            </a:pPr>
+            <a:r>
+              <a:rPr lang="en-US" sz="1600" dirty="0">
+                <a:latin typeface="+mn-lt"/>
+              </a:rPr>
+              <a:t>On the contrary, our average fusion implementation excels as a top-performer</a:t>
+            </a:r>
+          </a:p>
+        </p:txBody>
+      </p:sp>
+    </p:spTree>
+    <p:extLst>
+      <p:ext uri="{BB962C8B-B14F-4D97-AF65-F5344CB8AC3E}">
+        <p14:creationId xmlns:p14="http://schemas.microsoft.com/office/powerpoint/2010/main" val="2530954983"/>
       </p:ext>
     </p:extLst>
   </p:cSld>

</xml_diff>